<commit_message>
upd: added titles and summary
</commit_message>
<xml_diff>
--- a/SAOD_massive_stack2 (1).pptx
+++ b/SAOD_massive_stack2 (1).pptx
@@ -21,7 +21,8 @@
     <p:sldId id="309" r:id="rId15"/>
     <p:sldId id="310" r:id="rId16"/>
     <p:sldId id="312" r:id="rId17"/>
-    <p:sldId id="311" r:id="rId18"/>
+    <p:sldId id="314" r:id="rId18"/>
+    <p:sldId id="313" r:id="rId19"/>
   </p:sldIdLst>
   <p:sldSz cx="12192000" cy="6858000"/>
   <p:notesSz cx="6858000" cy="9144000"/>
@@ -2336,6 +2337,52 @@
           </a:prstGeom>
         </p:spPr>
       </p:pic>
+      <p:sp>
+        <p:nvSpPr>
+          <p:cNvPr id="2" name="TextBox 1"/>
+          <p:cNvSpPr txBox="1"/>
+          <p:nvPr/>
+        </p:nvSpPr>
+        <p:spPr>
+          <a:xfrm>
+            <a:off x="1209674" y="4819650"/>
+            <a:ext cx="4029076" cy="923330"/>
+          </a:xfrm>
+          <a:prstGeom prst="rect">
+            <a:avLst/>
+          </a:prstGeom>
+          <a:noFill/>
+        </p:spPr>
+        <p:txBody>
+          <a:bodyPr wrap="square" rtlCol="0">
+            <a:spAutoFit/>
+          </a:bodyPr>
+          <a:lstStyle/>
+          <a:p>
+            <a:r>
+              <a:rPr lang="ru-RU" dirty="0" smtClean="0"/>
+              <a:t>Подготовили: </a:t>
+            </a:r>
+          </a:p>
+          <a:p>
+            <a:r>
+              <a:rPr lang="ru-RU" dirty="0" smtClean="0"/>
+              <a:t>Мамбетов К.</a:t>
+            </a:r>
+          </a:p>
+          <a:p>
+            <a:r>
+              <a:rPr lang="ru-RU" dirty="0" err="1" smtClean="0"/>
+              <a:t>Фахритдинова</a:t>
+            </a:r>
+            <a:r>
+              <a:rPr lang="ru-RU" dirty="0" smtClean="0"/>
+              <a:t> Э.</a:t>
+            </a:r>
+            <a:endParaRPr lang="ru-RU" dirty="0"/>
+          </a:p>
+        </p:txBody>
+      </p:sp>
     </p:spTree>
     <p:extLst>
       <p:ext uri="{BB962C8B-B14F-4D97-AF65-F5344CB8AC3E}">
@@ -2446,6 +2493,67 @@
           </a:prstGeom>
         </p:spPr>
       </p:pic>
+      <p:sp>
+        <p:nvSpPr>
+          <p:cNvPr id="6" name="TextBox 5"/>
+          <p:cNvSpPr txBox="1"/>
+          <p:nvPr/>
+        </p:nvSpPr>
+        <p:spPr>
+          <a:xfrm>
+            <a:off x="3540244" y="4021063"/>
+            <a:ext cx="781050" cy="369332"/>
+          </a:xfrm>
+          <a:prstGeom prst="rect">
+            <a:avLst/>
+          </a:prstGeom>
+          <a:noFill/>
+        </p:spPr>
+        <p:txBody>
+          <a:bodyPr wrap="square" rtlCol="0">
+            <a:spAutoFit/>
+          </a:bodyPr>
+          <a:lstStyle/>
+          <a:p>
+            <a:r>
+              <a:rPr lang="ru-RU" dirty="0" smtClean="0"/>
+              <a:t>Стек</a:t>
+            </a:r>
+            <a:endParaRPr lang="ru-RU" dirty="0"/>
+          </a:p>
+        </p:txBody>
+      </p:sp>
+      <p:sp>
+        <p:nvSpPr>
+          <p:cNvPr id="7" name="TextBox 6"/>
+          <p:cNvSpPr txBox="1"/>
+          <p:nvPr/>
+        </p:nvSpPr>
+        <p:spPr>
+          <a:xfrm>
+            <a:off x="8408777" y="5764138"/>
+            <a:ext cx="1196555" cy="369332"/>
+          </a:xfrm>
+          <a:prstGeom prst="rect">
+            <a:avLst/>
+          </a:prstGeom>
+          <a:noFill/>
+        </p:spPr>
+        <p:txBody>
+          <a:bodyPr wrap="square" rtlCol="0">
+            <a:spAutoFit/>
+          </a:bodyPr>
+          <a:lstStyle/>
+          <a:p>
+            <a:pPr algn="ctr"/>
+            <a:r>
+              <a:rPr lang="ru-RU" dirty="0" smtClean="0"/>
+              <a:t>Массив</a:t>
+            </a:r>
+            <a:endParaRPr lang="ru-RU" dirty="0"/>
+          </a:p>
+        </p:txBody>
+      </p:sp>
     </p:spTree>
     <p:extLst>
       <p:ext uri="{BB962C8B-B14F-4D97-AF65-F5344CB8AC3E}">
@@ -2885,6 +2993,67 @@
           </a:prstGeom>
         </p:spPr>
       </p:pic>
+      <p:sp>
+        <p:nvSpPr>
+          <p:cNvPr id="6" name="TextBox 5"/>
+          <p:cNvSpPr txBox="1"/>
+          <p:nvPr/>
+        </p:nvSpPr>
+        <p:spPr>
+          <a:xfrm>
+            <a:off x="3729037" y="4648199"/>
+            <a:ext cx="781050" cy="369332"/>
+          </a:xfrm>
+          <a:prstGeom prst="rect">
+            <a:avLst/>
+          </a:prstGeom>
+          <a:noFill/>
+        </p:spPr>
+        <p:txBody>
+          <a:bodyPr wrap="square" rtlCol="0">
+            <a:spAutoFit/>
+          </a:bodyPr>
+          <a:lstStyle/>
+          <a:p>
+            <a:r>
+              <a:rPr lang="ru-RU" dirty="0" smtClean="0"/>
+              <a:t>Стек</a:t>
+            </a:r>
+            <a:endParaRPr lang="ru-RU" dirty="0"/>
+          </a:p>
+        </p:txBody>
+      </p:sp>
+      <p:sp>
+        <p:nvSpPr>
+          <p:cNvPr id="7" name="TextBox 6"/>
+          <p:cNvSpPr txBox="1"/>
+          <p:nvPr/>
+        </p:nvSpPr>
+        <p:spPr>
+          <a:xfrm>
+            <a:off x="8154658" y="4648199"/>
+            <a:ext cx="1196555" cy="369332"/>
+          </a:xfrm>
+          <a:prstGeom prst="rect">
+            <a:avLst/>
+          </a:prstGeom>
+          <a:noFill/>
+        </p:spPr>
+        <p:txBody>
+          <a:bodyPr wrap="square" rtlCol="0">
+            <a:spAutoFit/>
+          </a:bodyPr>
+          <a:lstStyle/>
+          <a:p>
+            <a:pPr algn="ctr"/>
+            <a:r>
+              <a:rPr lang="ru-RU" dirty="0" smtClean="0"/>
+              <a:t>Массив</a:t>
+            </a:r>
+            <a:endParaRPr lang="ru-RU" dirty="0"/>
+          </a:p>
+        </p:txBody>
+      </p:sp>
     </p:spTree>
     <p:extLst>
       <p:ext uri="{BB962C8B-B14F-4D97-AF65-F5344CB8AC3E}">
@@ -3454,6 +3623,67 @@
           </a:prstGeom>
         </p:spPr>
       </p:pic>
+      <p:sp>
+        <p:nvSpPr>
+          <p:cNvPr id="8" name="TextBox 7"/>
+          <p:cNvSpPr txBox="1"/>
+          <p:nvPr/>
+        </p:nvSpPr>
+        <p:spPr>
+          <a:xfrm>
+            <a:off x="3648075" y="4648199"/>
+            <a:ext cx="781050" cy="369332"/>
+          </a:xfrm>
+          <a:prstGeom prst="rect">
+            <a:avLst/>
+          </a:prstGeom>
+          <a:noFill/>
+        </p:spPr>
+        <p:txBody>
+          <a:bodyPr wrap="square" rtlCol="0">
+            <a:spAutoFit/>
+          </a:bodyPr>
+          <a:lstStyle/>
+          <a:p>
+            <a:r>
+              <a:rPr lang="ru-RU" dirty="0" smtClean="0"/>
+              <a:t>Стек</a:t>
+            </a:r>
+            <a:endParaRPr lang="ru-RU" dirty="0"/>
+          </a:p>
+        </p:txBody>
+      </p:sp>
+      <p:sp>
+        <p:nvSpPr>
+          <p:cNvPr id="9" name="TextBox 8"/>
+          <p:cNvSpPr txBox="1"/>
+          <p:nvPr/>
+        </p:nvSpPr>
+        <p:spPr>
+          <a:xfrm>
+            <a:off x="8351537" y="4648199"/>
+            <a:ext cx="1196555" cy="369332"/>
+          </a:xfrm>
+          <a:prstGeom prst="rect">
+            <a:avLst/>
+          </a:prstGeom>
+          <a:noFill/>
+        </p:spPr>
+        <p:txBody>
+          <a:bodyPr wrap="square" rtlCol="0">
+            <a:spAutoFit/>
+          </a:bodyPr>
+          <a:lstStyle/>
+          <a:p>
+            <a:pPr algn="ctr"/>
+            <a:r>
+              <a:rPr lang="ru-RU" dirty="0" smtClean="0"/>
+              <a:t>Массив</a:t>
+            </a:r>
+            <a:endParaRPr lang="ru-RU" dirty="0"/>
+          </a:p>
+        </p:txBody>
+      </p:sp>
     </p:spTree>
     <p:extLst>
       <p:ext uri="{BB962C8B-B14F-4D97-AF65-F5344CB8AC3E}">
@@ -3901,7 +4131,7 @@
         </p:blipFill>
         <p:spPr>
           <a:xfrm>
-            <a:off x="5964807" y="3005258"/>
+            <a:off x="6145961" y="2976683"/>
             <a:ext cx="5207839" cy="1301960"/>
           </a:xfrm>
           <a:prstGeom prst="rect">
@@ -3909,6 +4139,91 @@
           </a:prstGeom>
         </p:spPr>
       </p:pic>
+      <p:pic>
+        <p:nvPicPr>
+          <p:cNvPr id="3" name="Рисунок 2"/>
+          <p:cNvPicPr>
+            <a:picLocks noChangeAspect="1"/>
+          </p:cNvPicPr>
+          <p:nvPr/>
+        </p:nvPicPr>
+        <p:blipFill>
+          <a:blip r:embed="rId4"/>
+          <a:stretch>
+            <a:fillRect/>
+          </a:stretch>
+        </p:blipFill>
+        <p:spPr>
+          <a:xfrm>
+            <a:off x="1213449" y="4078618"/>
+            <a:ext cx="4177030" cy="340982"/>
+          </a:xfrm>
+          <a:prstGeom prst="rect">
+            <a:avLst/>
+          </a:prstGeom>
+        </p:spPr>
+      </p:pic>
+      <p:sp>
+        <p:nvSpPr>
+          <p:cNvPr id="5" name="TextBox 4"/>
+          <p:cNvSpPr txBox="1"/>
+          <p:nvPr/>
+        </p:nvSpPr>
+        <p:spPr>
+          <a:xfrm>
+            <a:off x="2905126" y="4648199"/>
+            <a:ext cx="781050" cy="369332"/>
+          </a:xfrm>
+          <a:prstGeom prst="rect">
+            <a:avLst/>
+          </a:prstGeom>
+          <a:noFill/>
+        </p:spPr>
+        <p:txBody>
+          <a:bodyPr wrap="square" rtlCol="0">
+            <a:spAutoFit/>
+          </a:bodyPr>
+          <a:lstStyle/>
+          <a:p>
+            <a:r>
+              <a:rPr lang="ru-RU" dirty="0" smtClean="0"/>
+              <a:t>Стек</a:t>
+            </a:r>
+            <a:endParaRPr lang="ru-RU" dirty="0"/>
+          </a:p>
+        </p:txBody>
+      </p:sp>
+      <p:sp>
+        <p:nvSpPr>
+          <p:cNvPr id="9" name="TextBox 8"/>
+          <p:cNvSpPr txBox="1"/>
+          <p:nvPr/>
+        </p:nvSpPr>
+        <p:spPr>
+          <a:xfrm>
+            <a:off x="8151602" y="4648199"/>
+            <a:ext cx="1196555" cy="369332"/>
+          </a:xfrm>
+          <a:prstGeom prst="rect">
+            <a:avLst/>
+          </a:prstGeom>
+          <a:noFill/>
+        </p:spPr>
+        <p:txBody>
+          <a:bodyPr wrap="square" rtlCol="0">
+            <a:spAutoFit/>
+          </a:bodyPr>
+          <a:lstStyle/>
+          <a:p>
+            <a:pPr algn="ctr"/>
+            <a:r>
+              <a:rPr lang="ru-RU" dirty="0" smtClean="0"/>
+              <a:t>Массив</a:t>
+            </a:r>
+            <a:endParaRPr lang="ru-RU" dirty="0"/>
+          </a:p>
+        </p:txBody>
+      </p:sp>
     </p:spTree>
     <p:extLst>
       <p:ext uri="{BB962C8B-B14F-4D97-AF65-F5344CB8AC3E}">
@@ -3962,57 +4277,688 @@
           </a:p>
         </p:txBody>
       </p:sp>
-      <p:pic>
-        <p:nvPicPr>
-          <p:cNvPr id="2" name="Рисунок 1"/>
-          <p:cNvPicPr>
-            <a:picLocks noChangeAspect="1"/>
-          </p:cNvPicPr>
-          <p:nvPr/>
-        </p:nvPicPr>
-        <p:blipFill rotWithShape="1">
-          <a:blip r:embed="rId2"/>
-          <a:srcRect t="1140"/>
-          <a:stretch/>
-        </p:blipFill>
-        <p:spPr>
-          <a:xfrm>
-            <a:off x="2125423" y="2032509"/>
-            <a:ext cx="3524880" cy="3921169"/>
-          </a:xfrm>
-          <a:prstGeom prst="rect">
-            <a:avLst/>
-          </a:prstGeom>
-        </p:spPr>
-      </p:pic>
-      <p:pic>
-        <p:nvPicPr>
-          <p:cNvPr id="5" name="Рисунок 4"/>
-          <p:cNvPicPr>
-            <a:picLocks noChangeAspect="1"/>
-          </p:cNvPicPr>
-          <p:nvPr/>
-        </p:nvPicPr>
-        <p:blipFill>
-          <a:blip r:embed="rId3"/>
-          <a:stretch>
-            <a:fillRect/>
-          </a:stretch>
-        </p:blipFill>
-        <p:spPr>
-          <a:xfrm>
-            <a:off x="6647177" y="1594950"/>
-            <a:ext cx="3109298" cy="5001681"/>
-          </a:xfrm>
-          <a:prstGeom prst="rect">
-            <a:avLst/>
-          </a:prstGeom>
-        </p:spPr>
-      </p:pic>
+      <p:graphicFrame>
+        <p:nvGraphicFramePr>
+          <p:cNvPr id="8" name="Таблица 7"/>
+          <p:cNvGraphicFramePr>
+            <a:graphicFrameLocks noGrp="1"/>
+          </p:cNvGraphicFramePr>
+          <p:nvPr>
+            <p:extLst>
+              <p:ext uri="{D42A27DB-BD31-4B8C-83A1-F6EECF244321}">
+                <p14:modId xmlns:p14="http://schemas.microsoft.com/office/powerpoint/2010/main" val="454742997"/>
+              </p:ext>
+            </p:extLst>
+          </p:nvPr>
+        </p:nvGraphicFramePr>
+        <p:xfrm>
+          <a:off x="2032000" y="2176991"/>
+          <a:ext cx="8127999" cy="3774440"/>
+        </p:xfrm>
+        <a:graphic>
+          <a:graphicData uri="http://schemas.openxmlformats.org/drawingml/2006/table">
+            <a:tbl>
+              <a:tblPr firstRow="1" bandRow="1">
+                <a:tableStyleId>{5C22544A-7EE6-4342-B048-85BDC9FD1C3A}</a:tableStyleId>
+              </a:tblPr>
+              <a:tblGrid>
+                <a:gridCol w="2709333">
+                  <a:extLst>
+                    <a:ext uri="{9D8B030D-6E8A-4147-A177-3AD203B41FA5}">
+                      <a16:colId xmlns:a16="http://schemas.microsoft.com/office/drawing/2014/main" val="2273258793"/>
+                    </a:ext>
+                  </a:extLst>
+                </a:gridCol>
+                <a:gridCol w="2709333">
+                  <a:extLst>
+                    <a:ext uri="{9D8B030D-6E8A-4147-A177-3AD203B41FA5}">
+                      <a16:colId xmlns:a16="http://schemas.microsoft.com/office/drawing/2014/main" val="4085882454"/>
+                    </a:ext>
+                  </a:extLst>
+                </a:gridCol>
+                <a:gridCol w="2709333">
+                  <a:extLst>
+                    <a:ext uri="{9D8B030D-6E8A-4147-A177-3AD203B41FA5}">
+                      <a16:colId xmlns:a16="http://schemas.microsoft.com/office/drawing/2014/main" val="4087228358"/>
+                    </a:ext>
+                  </a:extLst>
+                </a:gridCol>
+              </a:tblGrid>
+              <a:tr h="370840">
+                <a:tc>
+                  <a:txBody>
+                    <a:bodyPr/>
+                    <a:lstStyle/>
+                    <a:p>
+                      <a:r>
+                        <a:rPr lang="ru-RU" dirty="0" smtClean="0">
+                          <a:effectLst/>
+                        </a:rPr>
+                        <a:t>Операция</a:t>
+                      </a:r>
+                      <a:endParaRPr lang="ru-RU" dirty="0">
+                        <a:effectLst/>
+                      </a:endParaRPr>
+                    </a:p>
+                  </a:txBody>
+                  <a:tcPr/>
+                </a:tc>
+                <a:tc>
+                  <a:txBody>
+                    <a:bodyPr/>
+                    <a:lstStyle/>
+                    <a:p>
+                      <a:r>
+                        <a:rPr lang="ru-RU" dirty="0" smtClean="0">
+                          <a:effectLst/>
+                        </a:rPr>
+                        <a:t>Стек</a:t>
+                      </a:r>
+                      <a:endParaRPr lang="ru-RU" dirty="0">
+                        <a:effectLst/>
+                      </a:endParaRPr>
+                    </a:p>
+                  </a:txBody>
+                  <a:tcPr/>
+                </a:tc>
+                <a:tc>
+                  <a:txBody>
+                    <a:bodyPr/>
+                    <a:lstStyle/>
+                    <a:p>
+                      <a:r>
+                        <a:rPr lang="ru-RU" dirty="0" smtClean="0">
+                          <a:effectLst/>
+                        </a:rPr>
+                        <a:t>Массив</a:t>
+                      </a:r>
+                      <a:endParaRPr lang="ru-RU" dirty="0">
+                        <a:effectLst/>
+                      </a:endParaRPr>
+                    </a:p>
+                  </a:txBody>
+                  <a:tcPr/>
+                </a:tc>
+                <a:extLst>
+                  <a:ext uri="{0D108BD9-81ED-4DB2-BD59-A6C34878D82A}">
+                    <a16:rowId xmlns:a16="http://schemas.microsoft.com/office/drawing/2014/main" val="3750565929"/>
+                  </a:ext>
+                </a:extLst>
+              </a:tr>
+              <a:tr h="370840">
+                <a:tc>
+                  <a:txBody>
+                    <a:bodyPr/>
+                    <a:lstStyle/>
+                    <a:p>
+                      <a:r>
+                        <a:rPr lang="ru-RU" dirty="0" smtClean="0">
+                          <a:effectLst/>
+                        </a:rPr>
+                        <a:t>Ввод данных</a:t>
+                      </a:r>
+                      <a:endParaRPr lang="ru-RU" dirty="0">
+                        <a:effectLst/>
+                      </a:endParaRPr>
+                    </a:p>
+                  </a:txBody>
+                  <a:tcPr/>
+                </a:tc>
+                <a:tc>
+                  <a:txBody>
+                    <a:bodyPr/>
+                    <a:lstStyle/>
+                    <a:p>
+                      <a:r>
+                        <a:rPr lang="en-US" dirty="0" smtClean="0">
+                          <a:effectLst/>
+                        </a:rPr>
+                        <a:t>O(n)</a:t>
+                      </a:r>
+                      <a:endParaRPr lang="ru-RU" dirty="0">
+                        <a:effectLst/>
+                      </a:endParaRPr>
+                    </a:p>
+                  </a:txBody>
+                  <a:tcPr/>
+                </a:tc>
+                <a:tc>
+                  <a:txBody>
+                    <a:bodyPr/>
+                    <a:lstStyle/>
+                    <a:p>
+                      <a:r>
+                        <a:rPr lang="en-US" dirty="0" smtClean="0">
+                          <a:effectLst/>
+                        </a:rPr>
+                        <a:t>O(n)</a:t>
+                      </a:r>
+                      <a:endParaRPr lang="ru-RU" dirty="0">
+                        <a:effectLst/>
+                      </a:endParaRPr>
+                    </a:p>
+                  </a:txBody>
+                  <a:tcPr/>
+                </a:tc>
+                <a:extLst>
+                  <a:ext uri="{0D108BD9-81ED-4DB2-BD59-A6C34878D82A}">
+                    <a16:rowId xmlns:a16="http://schemas.microsoft.com/office/drawing/2014/main" val="1328358380"/>
+                  </a:ext>
+                </a:extLst>
+              </a:tr>
+              <a:tr h="370840">
+                <a:tc>
+                  <a:txBody>
+                    <a:bodyPr/>
+                    <a:lstStyle/>
+                    <a:p>
+                      <a:r>
+                        <a:rPr lang="ru-RU" dirty="0" smtClean="0">
+                          <a:effectLst/>
+                        </a:rPr>
+                        <a:t>Занимаемая</a:t>
+                      </a:r>
+                      <a:r>
+                        <a:rPr lang="ru-RU" baseline="0" dirty="0" smtClean="0">
+                          <a:effectLst/>
+                        </a:rPr>
+                        <a:t> память</a:t>
+                      </a:r>
+                    </a:p>
+                    <a:p>
+                      <a:r>
+                        <a:rPr lang="ru-RU" baseline="0" dirty="0" smtClean="0">
+                          <a:effectLst/>
+                        </a:rPr>
+                        <a:t>(один элемент)</a:t>
+                      </a:r>
+                      <a:endParaRPr lang="ru-RU" dirty="0">
+                        <a:effectLst/>
+                      </a:endParaRPr>
+                    </a:p>
+                  </a:txBody>
+                  <a:tcPr/>
+                </a:tc>
+                <a:tc>
+                  <a:txBody>
+                    <a:bodyPr/>
+                    <a:lstStyle/>
+                    <a:p>
+                      <a:r>
+                        <a:rPr lang="en-US" dirty="0" smtClean="0">
+                          <a:effectLst/>
+                        </a:rPr>
+                        <a:t>16 </a:t>
+                      </a:r>
+                      <a:r>
+                        <a:rPr lang="ru-RU" dirty="0" smtClean="0">
+                          <a:effectLst/>
+                        </a:rPr>
+                        <a:t>байт</a:t>
+                      </a:r>
+                      <a:endParaRPr lang="ru-RU" dirty="0">
+                        <a:effectLst/>
+                      </a:endParaRPr>
+                    </a:p>
+                  </a:txBody>
+                  <a:tcPr/>
+                </a:tc>
+                <a:tc>
+                  <a:txBody>
+                    <a:bodyPr/>
+                    <a:lstStyle/>
+                    <a:p>
+                      <a:r>
+                        <a:rPr lang="ru-RU" dirty="0" smtClean="0">
+                          <a:effectLst/>
+                        </a:rPr>
+                        <a:t>4 байта</a:t>
+                      </a:r>
+                      <a:endParaRPr lang="ru-RU" dirty="0">
+                        <a:effectLst/>
+                      </a:endParaRPr>
+                    </a:p>
+                  </a:txBody>
+                  <a:tcPr/>
+                </a:tc>
+                <a:extLst>
+                  <a:ext uri="{0D108BD9-81ED-4DB2-BD59-A6C34878D82A}">
+                    <a16:rowId xmlns:a16="http://schemas.microsoft.com/office/drawing/2014/main" val="1165804963"/>
+                  </a:ext>
+                </a:extLst>
+              </a:tr>
+              <a:tr h="370840">
+                <a:tc>
+                  <a:txBody>
+                    <a:bodyPr/>
+                    <a:lstStyle/>
+                    <a:p>
+                      <a:r>
+                        <a:rPr lang="ru-RU" dirty="0" smtClean="0">
+                          <a:effectLst/>
+                        </a:rPr>
+                        <a:t>Добавить элемент</a:t>
+                      </a:r>
+                      <a:endParaRPr lang="ru-RU" dirty="0">
+                        <a:effectLst/>
+                      </a:endParaRPr>
+                    </a:p>
+                  </a:txBody>
+                  <a:tcPr/>
+                </a:tc>
+                <a:tc>
+                  <a:txBody>
+                    <a:bodyPr/>
+                    <a:lstStyle/>
+                    <a:p>
+                      <a:r>
+                        <a:rPr lang="en-US" dirty="0" smtClean="0">
+                          <a:effectLst/>
+                        </a:rPr>
+                        <a:t>O(</a:t>
+                      </a:r>
+                      <a:r>
+                        <a:rPr lang="ru-RU" dirty="0" smtClean="0">
+                          <a:effectLst/>
+                        </a:rPr>
+                        <a:t>1</a:t>
+                      </a:r>
+                      <a:r>
+                        <a:rPr lang="en-US" dirty="0" smtClean="0">
+                          <a:effectLst/>
+                        </a:rPr>
+                        <a:t>)</a:t>
+                      </a:r>
+                      <a:endParaRPr lang="ru-RU" dirty="0">
+                        <a:effectLst/>
+                      </a:endParaRPr>
+                    </a:p>
+                  </a:txBody>
+                  <a:tcPr/>
+                </a:tc>
+                <a:tc>
+                  <a:txBody>
+                    <a:bodyPr/>
+                    <a:lstStyle/>
+                    <a:p>
+                      <a:r>
+                        <a:rPr lang="en-US" dirty="0" smtClean="0">
+                          <a:effectLst/>
+                        </a:rPr>
+                        <a:t>O(n)</a:t>
+                      </a:r>
+                      <a:endParaRPr lang="ru-RU" dirty="0">
+                        <a:effectLst/>
+                      </a:endParaRPr>
+                    </a:p>
+                  </a:txBody>
+                  <a:tcPr/>
+                </a:tc>
+                <a:extLst>
+                  <a:ext uri="{0D108BD9-81ED-4DB2-BD59-A6C34878D82A}">
+                    <a16:rowId xmlns:a16="http://schemas.microsoft.com/office/drawing/2014/main" val="3111431212"/>
+                  </a:ext>
+                </a:extLst>
+              </a:tr>
+              <a:tr h="370840">
+                <a:tc>
+                  <a:txBody>
+                    <a:bodyPr/>
+                    <a:lstStyle/>
+                    <a:p>
+                      <a:r>
+                        <a:rPr lang="ru-RU" dirty="0" smtClean="0">
+                          <a:effectLst/>
+                        </a:rPr>
+                        <a:t>Удалить элемент</a:t>
+                      </a:r>
+                      <a:endParaRPr lang="ru-RU" dirty="0">
+                        <a:effectLst/>
+                      </a:endParaRPr>
+                    </a:p>
+                  </a:txBody>
+                  <a:tcPr/>
+                </a:tc>
+                <a:tc>
+                  <a:txBody>
+                    <a:bodyPr/>
+                    <a:lstStyle/>
+                    <a:p>
+                      <a:r>
+                        <a:rPr lang="en-US" dirty="0" smtClean="0">
+                          <a:effectLst/>
+                        </a:rPr>
+                        <a:t>O(</a:t>
+                      </a:r>
+                      <a:r>
+                        <a:rPr lang="ru-RU" dirty="0" smtClean="0">
+                          <a:effectLst/>
+                        </a:rPr>
+                        <a:t>1</a:t>
+                      </a:r>
+                      <a:r>
+                        <a:rPr lang="en-US" dirty="0" smtClean="0">
+                          <a:effectLst/>
+                        </a:rPr>
+                        <a:t>)</a:t>
+                      </a:r>
+                      <a:endParaRPr lang="ru-RU" dirty="0">
+                        <a:effectLst/>
+                      </a:endParaRPr>
+                    </a:p>
+                  </a:txBody>
+                  <a:tcPr/>
+                </a:tc>
+                <a:tc>
+                  <a:txBody>
+                    <a:bodyPr/>
+                    <a:lstStyle/>
+                    <a:p>
+                      <a:r>
+                        <a:rPr lang="en-US" dirty="0" smtClean="0">
+                          <a:effectLst/>
+                        </a:rPr>
+                        <a:t>O(n)</a:t>
+                      </a:r>
+                      <a:endParaRPr lang="ru-RU" dirty="0">
+                        <a:effectLst/>
+                      </a:endParaRPr>
+                    </a:p>
+                  </a:txBody>
+                  <a:tcPr/>
+                </a:tc>
+                <a:extLst>
+                  <a:ext uri="{0D108BD9-81ED-4DB2-BD59-A6C34878D82A}">
+                    <a16:rowId xmlns:a16="http://schemas.microsoft.com/office/drawing/2014/main" val="2815971972"/>
+                  </a:ext>
+                </a:extLst>
+              </a:tr>
+              <a:tr h="370840">
+                <a:tc>
+                  <a:txBody>
+                    <a:bodyPr/>
+                    <a:lstStyle/>
+                    <a:p>
+                      <a:r>
+                        <a:rPr lang="ru-RU" dirty="0" smtClean="0">
+                          <a:effectLst/>
+                        </a:rPr>
+                        <a:t>Доступ к элементу</a:t>
+                      </a:r>
+                      <a:endParaRPr lang="ru-RU" dirty="0">
+                        <a:effectLst/>
+                      </a:endParaRPr>
+                    </a:p>
+                  </a:txBody>
+                  <a:tcPr/>
+                </a:tc>
+                <a:tc>
+                  <a:txBody>
+                    <a:bodyPr/>
+                    <a:lstStyle/>
+                    <a:p>
+                      <a:r>
+                        <a:rPr lang="en-US" dirty="0" smtClean="0">
+                          <a:effectLst/>
+                        </a:rPr>
+                        <a:t>O(n)</a:t>
+                      </a:r>
+                      <a:endParaRPr lang="ru-RU" dirty="0">
+                        <a:effectLst/>
+                      </a:endParaRPr>
+                    </a:p>
+                  </a:txBody>
+                  <a:tcPr/>
+                </a:tc>
+                <a:tc>
+                  <a:txBody>
+                    <a:bodyPr/>
+                    <a:lstStyle/>
+                    <a:p>
+                      <a:r>
+                        <a:rPr lang="en-US" dirty="0" smtClean="0">
+                          <a:effectLst/>
+                        </a:rPr>
+                        <a:t>O(</a:t>
+                      </a:r>
+                      <a:r>
+                        <a:rPr lang="ru-RU" dirty="0" smtClean="0">
+                          <a:effectLst/>
+                        </a:rPr>
+                        <a:t>1</a:t>
+                      </a:r>
+                      <a:r>
+                        <a:rPr lang="en-US" dirty="0" smtClean="0">
+                          <a:effectLst/>
+                        </a:rPr>
+                        <a:t>)</a:t>
+                      </a:r>
+                      <a:endParaRPr lang="ru-RU" dirty="0">
+                        <a:effectLst/>
+                      </a:endParaRPr>
+                    </a:p>
+                  </a:txBody>
+                  <a:tcPr/>
+                </a:tc>
+                <a:extLst>
+                  <a:ext uri="{0D108BD9-81ED-4DB2-BD59-A6C34878D82A}">
+                    <a16:rowId xmlns:a16="http://schemas.microsoft.com/office/drawing/2014/main" val="3378032470"/>
+                  </a:ext>
+                </a:extLst>
+              </a:tr>
+              <a:tr h="370840">
+                <a:tc>
+                  <a:txBody>
+                    <a:bodyPr/>
+                    <a:lstStyle/>
+                    <a:p>
+                      <a:r>
+                        <a:rPr lang="ru-RU" dirty="0" smtClean="0">
+                          <a:effectLst/>
+                        </a:rPr>
+                        <a:t>Подсчёт кол-ва</a:t>
+                      </a:r>
+                      <a:r>
+                        <a:rPr lang="ru-RU" baseline="0" dirty="0" smtClean="0">
+                          <a:effectLst/>
+                        </a:rPr>
+                        <a:t> элементов</a:t>
+                      </a:r>
+                      <a:endParaRPr lang="ru-RU" dirty="0">
+                        <a:effectLst/>
+                      </a:endParaRPr>
+                    </a:p>
+                  </a:txBody>
+                  <a:tcPr/>
+                </a:tc>
+                <a:tc>
+                  <a:txBody>
+                    <a:bodyPr/>
+                    <a:lstStyle/>
+                    <a:p>
+                      <a:r>
+                        <a:rPr lang="en-US" dirty="0" smtClean="0">
+                          <a:effectLst/>
+                        </a:rPr>
+                        <a:t>O(</a:t>
+                      </a:r>
+                      <a:r>
+                        <a:rPr lang="ru-RU" dirty="0" smtClean="0">
+                          <a:effectLst/>
+                        </a:rPr>
+                        <a:t>1</a:t>
+                      </a:r>
+                      <a:r>
+                        <a:rPr lang="en-US" dirty="0" smtClean="0">
+                          <a:effectLst/>
+                        </a:rPr>
+                        <a:t>)</a:t>
+                      </a:r>
+                      <a:endParaRPr lang="ru-RU" dirty="0">
+                        <a:effectLst/>
+                      </a:endParaRPr>
+                    </a:p>
+                  </a:txBody>
+                  <a:tcPr/>
+                </a:tc>
+                <a:tc>
+                  <a:txBody>
+                    <a:bodyPr/>
+                    <a:lstStyle/>
+                    <a:p>
+                      <a:r>
+                        <a:rPr lang="en-US" dirty="0" smtClean="0">
+                          <a:effectLst/>
+                        </a:rPr>
+                        <a:t>O(n)</a:t>
+                      </a:r>
+                      <a:endParaRPr lang="ru-RU" dirty="0">
+                        <a:effectLst/>
+                      </a:endParaRPr>
+                    </a:p>
+                  </a:txBody>
+                  <a:tcPr/>
+                </a:tc>
+                <a:extLst>
+                  <a:ext uri="{0D108BD9-81ED-4DB2-BD59-A6C34878D82A}">
+                    <a16:rowId xmlns:a16="http://schemas.microsoft.com/office/drawing/2014/main" val="327022973"/>
+                  </a:ext>
+                </a:extLst>
+              </a:tr>
+              <a:tr h="370840">
+                <a:tc>
+                  <a:txBody>
+                    <a:bodyPr/>
+                    <a:lstStyle/>
+                    <a:p>
+                      <a:r>
+                        <a:rPr lang="ru-RU" dirty="0" smtClean="0">
+                          <a:effectLst/>
+                        </a:rPr>
+                        <a:t>Удалить всю</a:t>
+                      </a:r>
+                      <a:r>
+                        <a:rPr lang="ru-RU" baseline="0" dirty="0" smtClean="0">
+                          <a:effectLst/>
+                        </a:rPr>
+                        <a:t> структуру</a:t>
+                      </a:r>
+                      <a:endParaRPr lang="ru-RU" dirty="0">
+                        <a:effectLst/>
+                      </a:endParaRPr>
+                    </a:p>
+                  </a:txBody>
+                  <a:tcPr/>
+                </a:tc>
+                <a:tc>
+                  <a:txBody>
+                    <a:bodyPr/>
+                    <a:lstStyle/>
+                    <a:p>
+                      <a:r>
+                        <a:rPr lang="en-US" dirty="0" smtClean="0">
+                          <a:effectLst/>
+                        </a:rPr>
+                        <a:t>O(n)</a:t>
+                      </a:r>
+                      <a:endParaRPr lang="ru-RU" dirty="0">
+                        <a:effectLst/>
+                      </a:endParaRPr>
+                    </a:p>
+                  </a:txBody>
+                  <a:tcPr/>
+                </a:tc>
+                <a:tc>
+                  <a:txBody>
+                    <a:bodyPr/>
+                    <a:lstStyle/>
+                    <a:p>
+                      <a:r>
+                        <a:rPr lang="en-US" dirty="0" smtClean="0">
+                          <a:effectLst/>
+                        </a:rPr>
+                        <a:t>O(n)</a:t>
+                      </a:r>
+                      <a:endParaRPr lang="ru-RU" b="1" dirty="0">
+                        <a:effectLst/>
+                      </a:endParaRPr>
+                    </a:p>
+                  </a:txBody>
+                  <a:tcPr/>
+                </a:tc>
+                <a:extLst>
+                  <a:ext uri="{0D108BD9-81ED-4DB2-BD59-A6C34878D82A}">
+                    <a16:rowId xmlns:a16="http://schemas.microsoft.com/office/drawing/2014/main" val="3023152935"/>
+                  </a:ext>
+                </a:extLst>
+              </a:tr>
+            </a:tbl>
+          </a:graphicData>
+        </a:graphic>
+      </p:graphicFrame>
     </p:spTree>
     <p:extLst>
       <p:ext uri="{BB962C8B-B14F-4D97-AF65-F5344CB8AC3E}">
-        <p14:creationId xmlns:p14="http://schemas.microsoft.com/office/powerpoint/2010/main" val="3248747276"/>
+        <p14:creationId xmlns:p14="http://schemas.microsoft.com/office/powerpoint/2010/main" val="2334383021"/>
+      </p:ext>
+    </p:extLst>
+  </p:cSld>
+  <p:clrMapOvr>
+    <a:masterClrMapping/>
+  </p:clrMapOvr>
+</p:sld>
+</file>
+
+<file path=ppt/slides/slide18.xml><?xml version="1.0" encoding="utf-8"?>
+<p:sld xmlns:a="http://schemas.openxmlformats.org/drawingml/2006/main" xmlns:r="http://schemas.openxmlformats.org/officeDocument/2006/relationships" xmlns:p="http://schemas.openxmlformats.org/presentationml/2006/main">
+  <p:cSld>
+    <p:spTree>
+      <p:nvGrpSpPr>
+        <p:cNvPr id="1" name=""/>
+        <p:cNvGrpSpPr/>
+        <p:nvPr/>
+      </p:nvGrpSpPr>
+      <p:grpSpPr>
+        <a:xfrm>
+          <a:off x="0" y="0"/>
+          <a:ext cx="0" cy="0"/>
+          <a:chOff x="0" y="0"/>
+          <a:chExt cx="0" cy="0"/>
+        </a:xfrm>
+      </p:grpSpPr>
+      <p:sp>
+        <p:nvSpPr>
+          <p:cNvPr id="2" name="Заголовок 1"/>
+          <p:cNvSpPr>
+            <a:spLocks noGrp="1"/>
+          </p:cNvSpPr>
+          <p:nvPr>
+            <p:ph type="title"/>
+          </p:nvPr>
+        </p:nvSpPr>
+        <p:spPr>
+          <a:xfrm>
+            <a:off x="1009650" y="2803525"/>
+            <a:ext cx="10515600" cy="1325563"/>
+          </a:xfrm>
+        </p:spPr>
+        <p:txBody>
+          <a:bodyPr/>
+          <a:lstStyle/>
+          <a:p>
+            <a:pPr algn="ctr"/>
+            <a:r>
+              <a:rPr lang="ru-RU" dirty="0" smtClean="0"/>
+              <a:t>Спасибо за внимание!</a:t>
+            </a:r>
+            <a:endParaRPr lang="ru-RU" dirty="0"/>
+          </a:p>
+        </p:txBody>
+      </p:sp>
+    </p:spTree>
+    <p:extLst>
+      <p:ext uri="{BB962C8B-B14F-4D97-AF65-F5344CB8AC3E}">
+        <p14:creationId xmlns:p14="http://schemas.microsoft.com/office/powerpoint/2010/main" val="1350961694"/>
       </p:ext>
     </p:extLst>
   </p:cSld>
@@ -4653,6 +5599,67 @@
           </a:prstGeom>
         </p:spPr>
       </p:pic>
+      <p:sp>
+        <p:nvSpPr>
+          <p:cNvPr id="6" name="TextBox 5"/>
+          <p:cNvSpPr txBox="1"/>
+          <p:nvPr/>
+        </p:nvSpPr>
+        <p:spPr>
+          <a:xfrm>
+            <a:off x="3153493" y="4278867"/>
+            <a:ext cx="781050" cy="369332"/>
+          </a:xfrm>
+          <a:prstGeom prst="rect">
+            <a:avLst/>
+          </a:prstGeom>
+          <a:noFill/>
+        </p:spPr>
+        <p:txBody>
+          <a:bodyPr wrap="square" rtlCol="0">
+            <a:spAutoFit/>
+          </a:bodyPr>
+          <a:lstStyle/>
+          <a:p>
+            <a:r>
+              <a:rPr lang="ru-RU" dirty="0" smtClean="0"/>
+              <a:t>Стек</a:t>
+            </a:r>
+            <a:endParaRPr lang="ru-RU" dirty="0"/>
+          </a:p>
+        </p:txBody>
+      </p:sp>
+      <p:sp>
+        <p:nvSpPr>
+          <p:cNvPr id="7" name="TextBox 6"/>
+          <p:cNvSpPr txBox="1"/>
+          <p:nvPr/>
+        </p:nvSpPr>
+        <p:spPr>
+          <a:xfrm>
+            <a:off x="8023026" y="4278867"/>
+            <a:ext cx="1196555" cy="369332"/>
+          </a:xfrm>
+          <a:prstGeom prst="rect">
+            <a:avLst/>
+          </a:prstGeom>
+          <a:noFill/>
+        </p:spPr>
+        <p:txBody>
+          <a:bodyPr wrap="square" rtlCol="0">
+            <a:spAutoFit/>
+          </a:bodyPr>
+          <a:lstStyle/>
+          <a:p>
+            <a:pPr algn="ctr"/>
+            <a:r>
+              <a:rPr lang="ru-RU" dirty="0" smtClean="0"/>
+              <a:t>Массив</a:t>
+            </a:r>
+            <a:endParaRPr lang="ru-RU" dirty="0"/>
+          </a:p>
+        </p:txBody>
+      </p:sp>
     </p:spTree>
     <p:extLst>
       <p:ext uri="{BB962C8B-B14F-4D97-AF65-F5344CB8AC3E}">
@@ -5193,6 +6200,67 @@
           </a:prstGeom>
         </p:spPr>
       </p:pic>
+      <p:sp>
+        <p:nvSpPr>
+          <p:cNvPr id="5" name="TextBox 4"/>
+          <p:cNvSpPr txBox="1"/>
+          <p:nvPr/>
+        </p:nvSpPr>
+        <p:spPr>
+          <a:xfrm>
+            <a:off x="3402221" y="4181474"/>
+            <a:ext cx="781050" cy="369332"/>
+          </a:xfrm>
+          <a:prstGeom prst="rect">
+            <a:avLst/>
+          </a:prstGeom>
+          <a:noFill/>
+        </p:spPr>
+        <p:txBody>
+          <a:bodyPr wrap="square" rtlCol="0">
+            <a:spAutoFit/>
+          </a:bodyPr>
+          <a:lstStyle/>
+          <a:p>
+            <a:r>
+              <a:rPr lang="ru-RU" dirty="0" smtClean="0"/>
+              <a:t>Стек</a:t>
+            </a:r>
+            <a:endParaRPr lang="ru-RU" dirty="0"/>
+          </a:p>
+        </p:txBody>
+      </p:sp>
+      <p:sp>
+        <p:nvSpPr>
+          <p:cNvPr id="7" name="TextBox 6"/>
+          <p:cNvSpPr txBox="1"/>
+          <p:nvPr/>
+        </p:nvSpPr>
+        <p:spPr>
+          <a:xfrm>
+            <a:off x="8128779" y="5419724"/>
+            <a:ext cx="1196555" cy="369332"/>
+          </a:xfrm>
+          <a:prstGeom prst="rect">
+            <a:avLst/>
+          </a:prstGeom>
+          <a:noFill/>
+        </p:spPr>
+        <p:txBody>
+          <a:bodyPr wrap="square" rtlCol="0">
+            <a:spAutoFit/>
+          </a:bodyPr>
+          <a:lstStyle/>
+          <a:p>
+            <a:pPr algn="ctr"/>
+            <a:r>
+              <a:rPr lang="ru-RU" dirty="0" smtClean="0"/>
+              <a:t>Массив</a:t>
+            </a:r>
+            <a:endParaRPr lang="ru-RU" dirty="0"/>
+          </a:p>
+        </p:txBody>
+      </p:sp>
     </p:spTree>
     <p:extLst>
       <p:ext uri="{BB962C8B-B14F-4D97-AF65-F5344CB8AC3E}">

</xml_diff>